<commit_message>
Ajout diag class http + mise à jour slide
</commit_message>
<xml_diff>
--- a/annexes/MohamedSlider.pptx
+++ b/annexes/MohamedSlider.pptx
@@ -13,6 +13,8 @@
     <p:sldId id="261" r:id="rId7"/>
     <p:sldId id="262" r:id="rId8"/>
     <p:sldId id="263" r:id="rId9"/>
+    <p:sldId id="265" r:id="rId10"/>
+    <p:sldId id="264" r:id="rId11"/>
   </p:sldIdLst>
   <p:sldSz cx="12192000" cy="6858000"/>
   <p:notesSz cx="6858000" cy="9144000"/>
@@ -214,7 +216,7 @@
           <a:effectLst/>
           <a:extLst>
             <a:ext uri="{91240B29-F687-4f45-9708-019B960494DF}">
-              <a14:hiddenLine xmlns="" xmlns:a14="http://schemas.microsoft.com/office/drawing/2010/main" w="9525">
+              <a14:hiddenLine xmlns:a14="http://schemas.microsoft.com/office/drawing/2010/main" xmlns="" w="9525">
                 <a:solidFill>
                   <a:srgbClr val="000000"/>
                 </a:solidFill>
@@ -1724,7 +1726,7 @@
           <a:ln/>
           <a:extLst>
             <a:ext uri="{91240B29-F687-4f45-9708-019B960494DF}">
-              <a14:hiddenLine xmlns="" xmlns:a14="http://schemas.microsoft.com/office/drawing/2010/main" w="9525">
+              <a14:hiddenLine xmlns:a14="http://schemas.microsoft.com/office/drawing/2010/main" xmlns="" w="9525">
                 <a:solidFill>
                   <a:srgbClr val="000000"/>
                 </a:solidFill>
@@ -1996,7 +1998,7 @@
           <a:ln/>
           <a:extLst>
             <a:ext uri="{91240B29-F687-4f45-9708-019B960494DF}">
-              <a14:hiddenLine xmlns="" xmlns:a14="http://schemas.microsoft.com/office/drawing/2010/main" w="9525">
+              <a14:hiddenLine xmlns:a14="http://schemas.microsoft.com/office/drawing/2010/main" xmlns="" w="9525">
                 <a:solidFill>
                   <a:srgbClr val="000000"/>
                 </a:solidFill>
@@ -2276,7 +2278,7 @@
           <a:ln/>
           <a:extLst>
             <a:ext uri="{91240B29-F687-4f45-9708-019B960494DF}">
-              <a14:hiddenLine xmlns="" xmlns:a14="http://schemas.microsoft.com/office/drawing/2010/main" w="9525">
+              <a14:hiddenLine xmlns:a14="http://schemas.microsoft.com/office/drawing/2010/main" xmlns="" w="9525">
                 <a:solidFill>
                   <a:srgbClr val="000000"/>
                 </a:solidFill>
@@ -2896,7 +2898,7 @@
           <a:ln/>
           <a:extLst>
             <a:ext uri="{91240B29-F687-4f45-9708-019B960494DF}">
-              <a14:hiddenLine xmlns="" xmlns:a14="http://schemas.microsoft.com/office/drawing/2010/main" w="9525">
+              <a14:hiddenLine xmlns:a14="http://schemas.microsoft.com/office/drawing/2010/main" xmlns="" w="9525">
                 <a:solidFill>
                   <a:srgbClr val="000000"/>
                 </a:solidFill>
@@ -3232,7 +3234,7 @@
           <a:ln/>
           <a:extLst>
             <a:ext uri="{91240B29-F687-4f45-9708-019B960494DF}">
-              <a14:hiddenLine xmlns="" xmlns:a14="http://schemas.microsoft.com/office/drawing/2010/main" w="9525">
+              <a14:hiddenLine xmlns:a14="http://schemas.microsoft.com/office/drawing/2010/main" xmlns="" w="9525">
                 <a:solidFill>
                   <a:srgbClr val="000000"/>
                 </a:solidFill>
@@ -3706,7 +3708,7 @@
           <a:ln/>
           <a:extLst>
             <a:ext uri="{91240B29-F687-4f45-9708-019B960494DF}">
-              <a14:hiddenLine xmlns="" xmlns:a14="http://schemas.microsoft.com/office/drawing/2010/main" w="9525">
+              <a14:hiddenLine xmlns:a14="http://schemas.microsoft.com/office/drawing/2010/main" xmlns="" w="9525">
                 <a:solidFill>
                   <a:srgbClr val="000000"/>
                 </a:solidFill>
@@ -4129,7 +4131,7 @@
           <a:ln/>
           <a:extLst>
             <a:ext uri="{91240B29-F687-4f45-9708-019B960494DF}">
-              <a14:hiddenLine xmlns="" xmlns:a14="http://schemas.microsoft.com/office/drawing/2010/main" w="9525">
+              <a14:hiddenLine xmlns:a14="http://schemas.microsoft.com/office/drawing/2010/main" xmlns="" w="9525">
                 <a:solidFill>
                   <a:srgbClr val="000000"/>
                 </a:solidFill>
@@ -5545,6 +5547,95 @@
 </p:sld>
 </file>
 
+<file path=ppt/slides/slide10.xml><?xml version="1.0" encoding="utf-8"?>
+<p:sld xmlns:a="http://schemas.openxmlformats.org/drawingml/2006/main" xmlns:r="http://schemas.openxmlformats.org/officeDocument/2006/relationships" xmlns:p="http://schemas.openxmlformats.org/presentationml/2006/main">
+  <p:cSld>
+    <p:spTree>
+      <p:nvGrpSpPr>
+        <p:cNvPr id="1" name=""/>
+        <p:cNvGrpSpPr/>
+        <p:nvPr/>
+      </p:nvGrpSpPr>
+      <p:grpSpPr>
+        <a:xfrm>
+          <a:off x="0" y="0"/>
+          <a:ext cx="0" cy="0"/>
+          <a:chOff x="0" y="0"/>
+          <a:chExt cx="0" cy="0"/>
+        </a:xfrm>
+      </p:grpSpPr>
+      <p:sp>
+        <p:nvSpPr>
+          <p:cNvPr id="2" name="Titre 1"/>
+          <p:cNvSpPr>
+            <a:spLocks noGrp="1"/>
+          </p:cNvSpPr>
+          <p:nvPr>
+            <p:ph type="title"/>
+          </p:nvPr>
+        </p:nvSpPr>
+        <p:spPr>
+          <a:xfrm>
+            <a:off x="784948" y="551144"/>
+            <a:ext cx="10571998" cy="766285"/>
+          </a:xfrm>
+        </p:spPr>
+        <p:txBody>
+          <a:bodyPr/>
+          <a:lstStyle/>
+          <a:p>
+            <a:pPr algn="ctr"/>
+            <a:r>
+              <a:rPr lang="fr-FR" dirty="0" smtClean="0"/>
+              <a:t>Diagramme de classe Communication</a:t>
+            </a:r>
+            <a:endParaRPr lang="fr-FR" dirty="0"/>
+          </a:p>
+        </p:txBody>
+      </p:sp>
+      <p:pic>
+        <p:nvPicPr>
+          <p:cNvPr id="4" name="Image 3"/>
+          <p:cNvPicPr>
+            <a:picLocks noChangeAspect="1"/>
+          </p:cNvPicPr>
+          <p:nvPr/>
+        </p:nvPicPr>
+        <p:blipFill>
+          <a:blip r:embed="rId2">
+            <a:extLst>
+              <a:ext uri="{28A0092B-C50C-407E-A947-70E740481C1C}">
+                <a14:useLocalDpi xmlns:a14="http://schemas.microsoft.com/office/drawing/2010/main" val="0"/>
+              </a:ext>
+            </a:extLst>
+          </a:blip>
+          <a:stretch>
+            <a:fillRect/>
+          </a:stretch>
+        </p:blipFill>
+        <p:spPr>
+          <a:xfrm>
+            <a:off x="1444737" y="2314613"/>
+            <a:ext cx="9252420" cy="4286603"/>
+          </a:xfrm>
+          <a:prstGeom prst="rect">
+            <a:avLst/>
+          </a:prstGeom>
+        </p:spPr>
+      </p:pic>
+    </p:spTree>
+    <p:extLst>
+      <p:ext uri="{BB962C8B-B14F-4D97-AF65-F5344CB8AC3E}">
+        <p14:creationId xmlns:p14="http://schemas.microsoft.com/office/powerpoint/2010/main" val="433153800"/>
+      </p:ext>
+    </p:extLst>
+  </p:cSld>
+  <p:clrMapOvr>
+    <a:masterClrMapping/>
+  </p:clrMapOvr>
+</p:sld>
+</file>
+
 <file path=ppt/slides/slide2.xml><?xml version="1.0" encoding="utf-8"?>
 <p:sld xmlns:a="http://schemas.openxmlformats.org/drawingml/2006/main" xmlns:r="http://schemas.openxmlformats.org/officeDocument/2006/relationships" xmlns:p="http://schemas.openxmlformats.org/presentationml/2006/main">
   <p:cSld>
@@ -6672,11 +6763,7 @@
             <a:pPr algn="ctr"/>
             <a:r>
               <a:rPr lang="fr-FR" sz="1400" b="1" dirty="0" smtClean="0"/>
-              <a:t>Http Client(Auteur : James </a:t>
-            </a:r>
-            <a:r>
-              <a:rPr lang="fr-FR" sz="1400" b="1" dirty="0" smtClean="0"/>
-              <a:t>Smith)</a:t>
+              <a:t>Http Client(Auteur : James Smith)</a:t>
             </a:r>
             <a:endParaRPr lang="fr-FR" sz="1400" b="1" dirty="0"/>
           </a:p>
@@ -6695,9 +6782,9 @@
         <p:grpSpPr>
           <a:xfrm>
             <a:off x="3100290" y="3480010"/>
-            <a:ext cx="5743083" cy="1559329"/>
-            <a:chOff x="3687486" y="3498078"/>
-            <a:chExt cx="3913987" cy="1091055"/>
+            <a:ext cx="5743083" cy="1402121"/>
+            <a:chOff x="3687486" y="3498077"/>
+            <a:chExt cx="3913987" cy="981057"/>
           </a:xfrm>
         </p:grpSpPr>
         <p:grpSp>
@@ -6708,10 +6795,10 @@
           </p:nvGrpSpPr>
           <p:grpSpPr>
             <a:xfrm>
-              <a:off x="3687486" y="3498078"/>
-              <a:ext cx="3913987" cy="1091055"/>
+              <a:off x="3687486" y="3498077"/>
+              <a:ext cx="3913987" cy="981057"/>
               <a:chOff x="2533934" y="3148917"/>
-              <a:chExt cx="5604223" cy="1496910"/>
+              <a:chExt cx="5604223" cy="1345995"/>
             </a:xfrm>
           </p:grpSpPr>
           <p:sp>
@@ -6762,7 +6849,7 @@
             </p:nvSpPr>
             <p:spPr>
               <a:xfrm rot="10800000">
-                <a:off x="2533934" y="4263442"/>
+                <a:off x="2533934" y="4112527"/>
                 <a:ext cx="5604223" cy="382385"/>
               </a:xfrm>
               <a:prstGeom prst="rightArrow">
@@ -6803,7 +6890,7 @@
           </p:nvSpPr>
           <p:spPr>
             <a:xfrm>
-              <a:off x="4573422" y="4055454"/>
+              <a:off x="4498945" y="3979540"/>
               <a:ext cx="2548897" cy="258420"/>
             </a:xfrm>
             <a:prstGeom prst="rect">
@@ -6924,7 +7011,7 @@
         </p:nvSpPr>
         <p:spPr>
           <a:xfrm>
-            <a:off x="4290963" y="5142905"/>
+            <a:off x="4390308" y="4882132"/>
             <a:ext cx="3163045" cy="830997"/>
           </a:xfrm>
           <a:prstGeom prst="rect">
@@ -6983,6 +7070,291 @@
     <p:extLst>
       <p:ext uri="{BB962C8B-B14F-4D97-AF65-F5344CB8AC3E}">
         <p14:creationId xmlns:p14="http://schemas.microsoft.com/office/powerpoint/2010/main" val="2987039880"/>
+      </p:ext>
+    </p:extLst>
+  </p:cSld>
+  <p:clrMapOvr>
+    <a:masterClrMapping/>
+  </p:clrMapOvr>
+</p:sld>
+</file>
+
+<file path=ppt/slides/slide9.xml><?xml version="1.0" encoding="utf-8"?>
+<p:sld xmlns:a="http://schemas.openxmlformats.org/drawingml/2006/main" xmlns:r="http://schemas.openxmlformats.org/officeDocument/2006/relationships" xmlns:p="http://schemas.openxmlformats.org/presentationml/2006/main">
+  <p:cSld>
+    <p:spTree>
+      <p:nvGrpSpPr>
+        <p:cNvPr id="1" name=""/>
+        <p:cNvGrpSpPr/>
+        <p:nvPr/>
+      </p:nvGrpSpPr>
+      <p:grpSpPr>
+        <a:xfrm>
+          <a:off x="0" y="0"/>
+          <a:ext cx="0" cy="0"/>
+          <a:chOff x="0" y="0"/>
+          <a:chExt cx="0" cy="0"/>
+        </a:xfrm>
+      </p:grpSpPr>
+      <p:sp>
+        <p:nvSpPr>
+          <p:cNvPr id="2" name="Titre 1"/>
+          <p:cNvSpPr>
+            <a:spLocks noGrp="1"/>
+          </p:cNvSpPr>
+          <p:nvPr>
+            <p:ph type="title"/>
+          </p:nvPr>
+        </p:nvSpPr>
+        <p:spPr>
+          <a:xfrm>
+            <a:off x="810000" y="559922"/>
+            <a:ext cx="10571998" cy="970450"/>
+          </a:xfrm>
+        </p:spPr>
+        <p:txBody>
+          <a:bodyPr/>
+          <a:lstStyle/>
+          <a:p>
+            <a:r>
+              <a:rPr lang="fr-FR" dirty="0">
+                <a:solidFill>
+                  <a:schemeClr val="tx1"/>
+                </a:solidFill>
+              </a:rPr>
+              <a:t>Mise en place de la communication entre l’application Android et le serveur</a:t>
+            </a:r>
+            <a:r>
+              <a:rPr lang="fr-FR" dirty="0" smtClean="0">
+                <a:solidFill>
+                  <a:schemeClr val="tx1"/>
+                </a:solidFill>
+              </a:rPr>
+              <a:t>. (SUITE)</a:t>
+            </a:r>
+            <a:endParaRPr lang="fr-FR" dirty="0"/>
+          </a:p>
+        </p:txBody>
+      </p:sp>
+      <p:pic>
+        <p:nvPicPr>
+          <p:cNvPr id="4" name="Espace réservé du contenu 5"/>
+          <p:cNvPicPr>
+            <a:picLocks noGrp="1" noChangeAspect="1"/>
+          </p:cNvPicPr>
+          <p:nvPr>
+            <p:ph idx="1"/>
+          </p:nvPr>
+        </p:nvPicPr>
+        <p:blipFill>
+          <a:blip r:embed="rId2">
+            <a:extLst>
+              <a:ext uri="{28A0092B-C50C-407E-A947-70E740481C1C}">
+                <a14:useLocalDpi xmlns:a14="http://schemas.microsoft.com/office/drawing/2010/main" val="0"/>
+              </a:ext>
+            </a:extLst>
+          </a:blip>
+          <a:stretch>
+            <a:fillRect/>
+          </a:stretch>
+        </p:blipFill>
+        <p:spPr>
+          <a:xfrm>
+            <a:off x="1044887" y="2986272"/>
+            <a:ext cx="1660732" cy="2657171"/>
+          </a:xfrm>
+        </p:spPr>
+      </p:pic>
+      <p:sp>
+        <p:nvSpPr>
+          <p:cNvPr id="5" name="Flèche courbée vers la gauche 4"/>
+          <p:cNvSpPr/>
+          <p:nvPr/>
+        </p:nvSpPr>
+        <p:spPr>
+          <a:xfrm>
+            <a:off x="2968667" y="3033650"/>
+            <a:ext cx="638827" cy="800840"/>
+          </a:xfrm>
+          <a:prstGeom prst="curvedLeftArrow">
+            <a:avLst/>
+          </a:prstGeom>
+        </p:spPr>
+        <p:style>
+          <a:lnRef idx="2">
+            <a:schemeClr val="accent1">
+              <a:shade val="50000"/>
+            </a:schemeClr>
+          </a:lnRef>
+          <a:fillRef idx="1">
+            <a:schemeClr val="accent1"/>
+          </a:fillRef>
+          <a:effectRef idx="0">
+            <a:schemeClr val="accent1"/>
+          </a:effectRef>
+          <a:fontRef idx="minor">
+            <a:schemeClr val="lt1"/>
+          </a:fontRef>
+        </p:style>
+        <p:txBody>
+          <a:bodyPr rtlCol="0" anchor="ctr"/>
+          <a:lstStyle/>
+          <a:p>
+            <a:pPr algn="ctr"/>
+            <a:endParaRPr lang="fr-FR">
+              <a:solidFill>
+                <a:schemeClr val="tx1"/>
+              </a:solidFill>
+            </a:endParaRPr>
+          </a:p>
+        </p:txBody>
+      </p:sp>
+      <p:sp>
+        <p:nvSpPr>
+          <p:cNvPr id="6" name="ZoneTexte 5"/>
+          <p:cNvSpPr txBox="1"/>
+          <p:nvPr/>
+        </p:nvSpPr>
+        <p:spPr>
+          <a:xfrm>
+            <a:off x="3870542" y="3138369"/>
+            <a:ext cx="4703532" cy="369332"/>
+          </a:xfrm>
+          <a:prstGeom prst="rect">
+            <a:avLst/>
+          </a:prstGeom>
+          <a:noFill/>
+        </p:spPr>
+        <p:txBody>
+          <a:bodyPr wrap="none" rtlCol="0">
+            <a:spAutoFit/>
+          </a:bodyPr>
+          <a:lstStyle/>
+          <a:p>
+            <a:r>
+              <a:rPr lang="fr-FR" dirty="0" smtClean="0"/>
+              <a:t>Vérification de la réponse par le serveur.</a:t>
+            </a:r>
+            <a:endParaRPr lang="fr-FR" dirty="0"/>
+          </a:p>
+        </p:txBody>
+      </p:sp>
+      <p:sp>
+        <p:nvSpPr>
+          <p:cNvPr id="7" name="Flèche courbée vers la gauche 6"/>
+          <p:cNvSpPr/>
+          <p:nvPr/>
+        </p:nvSpPr>
+        <p:spPr>
+          <a:xfrm>
+            <a:off x="2968666" y="4842603"/>
+            <a:ext cx="638827" cy="800840"/>
+          </a:xfrm>
+          <a:prstGeom prst="curvedLeftArrow">
+            <a:avLst/>
+          </a:prstGeom>
+        </p:spPr>
+        <p:style>
+          <a:lnRef idx="2">
+            <a:schemeClr val="accent1">
+              <a:shade val="50000"/>
+            </a:schemeClr>
+          </a:lnRef>
+          <a:fillRef idx="1">
+            <a:schemeClr val="accent1"/>
+          </a:fillRef>
+          <a:effectRef idx="0">
+            <a:schemeClr val="accent1"/>
+          </a:effectRef>
+          <a:fontRef idx="minor">
+            <a:schemeClr val="lt1"/>
+          </a:fontRef>
+        </p:style>
+        <p:txBody>
+          <a:bodyPr rtlCol="0" anchor="ctr"/>
+          <a:lstStyle/>
+          <a:p>
+            <a:pPr algn="ctr"/>
+            <a:endParaRPr lang="fr-FR">
+              <a:solidFill>
+                <a:schemeClr val="tx1"/>
+              </a:solidFill>
+            </a:endParaRPr>
+          </a:p>
+        </p:txBody>
+      </p:sp>
+      <p:sp>
+        <p:nvSpPr>
+          <p:cNvPr id="8" name="ZoneTexte 7"/>
+          <p:cNvSpPr txBox="1"/>
+          <p:nvPr/>
+        </p:nvSpPr>
+        <p:spPr>
+          <a:xfrm>
+            <a:off x="3870540" y="5058357"/>
+            <a:ext cx="7045518" cy="369332"/>
+          </a:xfrm>
+          <a:prstGeom prst="rect">
+            <a:avLst/>
+          </a:prstGeom>
+          <a:noFill/>
+        </p:spPr>
+        <p:txBody>
+          <a:bodyPr wrap="none" rtlCol="0">
+            <a:spAutoFit/>
+          </a:bodyPr>
+          <a:lstStyle/>
+          <a:p>
+            <a:r>
+              <a:rPr lang="fr-FR" dirty="0" smtClean="0"/>
+              <a:t>L’application lance l’application </a:t>
+            </a:r>
+            <a:r>
+              <a:rPr lang="fr-FR" dirty="0" err="1" smtClean="0"/>
+              <a:t>Youtube</a:t>
+            </a:r>
+            <a:r>
+              <a:rPr lang="fr-FR" dirty="0" smtClean="0"/>
+              <a:t> et affiche la vidéo.</a:t>
+            </a:r>
+            <a:endParaRPr lang="fr-FR" dirty="0"/>
+          </a:p>
+        </p:txBody>
+      </p:sp>
+      <p:sp>
+        <p:nvSpPr>
+          <p:cNvPr id="9" name="ZoneTexte 8"/>
+          <p:cNvSpPr txBox="1"/>
+          <p:nvPr/>
+        </p:nvSpPr>
+        <p:spPr>
+          <a:xfrm>
+            <a:off x="3870542" y="4130191"/>
+            <a:ext cx="721672" cy="369332"/>
+          </a:xfrm>
+          <a:prstGeom prst="rect">
+            <a:avLst/>
+          </a:prstGeom>
+          <a:noFill/>
+        </p:spPr>
+        <p:txBody>
+          <a:bodyPr wrap="none" rtlCol="0">
+            <a:spAutoFit/>
+          </a:bodyPr>
+          <a:lstStyle/>
+          <a:p>
+            <a:r>
+              <a:rPr lang="fr-FR" dirty="0" smtClean="0"/>
+              <a:t>OK ?</a:t>
+            </a:r>
+            <a:endParaRPr lang="fr-FR" dirty="0"/>
+          </a:p>
+        </p:txBody>
+      </p:sp>
+    </p:spTree>
+    <p:extLst>
+      <p:ext uri="{BB962C8B-B14F-4D97-AF65-F5344CB8AC3E}">
+        <p14:creationId xmlns:p14="http://schemas.microsoft.com/office/powerpoint/2010/main" val="2375332225"/>
       </p:ext>
     </p:extLst>
   </p:cSld>

</xml_diff>